<commit_message>
fine-tune the paper, write up results section
</commit_message>
<xml_diff>
--- a/workshop/qualitative_data/Group_1.pptx
+++ b/workshop/qualitative_data/Group_1.pptx
@@ -466,7 +466,7 @@
           <a:p>
             <a:fld id="{272F4A0F-D64E-BA44-A57C-7E75F2310D66}" type="datetimeFigureOut">
               <a:rPr lang="en-CH" smtClean="0"/>
-              <a:t>05/19/2023</a:t>
+              <a:t>10.06.23</a:t>
             </a:fld>
             <a:endParaRPr lang="en-CH"/>
           </a:p>
@@ -883,7 +883,7 @@
           <a:p>
             <a:fld id="{761C9DC4-B476-F942-853E-89826AA29869}" type="datetime1">
               <a:rPr lang="de-CH" smtClean="0"/>
-              <a:t>19.05.2023</a:t>
+              <a:t>10.06.23</a:t>
             </a:fld>
             <a:endParaRPr lang="en-CH"/>
           </a:p>
@@ -1087,7 +1087,7 @@
           <a:p>
             <a:fld id="{5E4D72C6-52C9-D44D-A925-01E9D4E49289}" type="datetime1">
               <a:rPr lang="de-CH" smtClean="0"/>
-              <a:t>19.05.2023</a:t>
+              <a:t>10.06.23</a:t>
             </a:fld>
             <a:endParaRPr lang="en-CH"/>
           </a:p>
@@ -1301,7 +1301,7 @@
           <a:p>
             <a:fld id="{BACE8BF5-6A3B-3F45-8333-FE19DF613A94}" type="datetime1">
               <a:rPr lang="de-CH" smtClean="0"/>
-              <a:t>19.05.2023</a:t>
+              <a:t>10.06.23</a:t>
             </a:fld>
             <a:endParaRPr lang="en-CH"/>
           </a:p>
@@ -1505,7 +1505,7 @@
           <a:p>
             <a:fld id="{7BD61E50-3B1D-144D-B67A-B91C71A803EF}" type="datetime1">
               <a:rPr lang="de-CH" smtClean="0"/>
-              <a:t>19.05.2023</a:t>
+              <a:t>10.06.23</a:t>
             </a:fld>
             <a:endParaRPr lang="en-CH"/>
           </a:p>
@@ -1785,7 +1785,7 @@
           <a:p>
             <a:fld id="{8D2226DB-D619-5549-8E7C-82A111A4E8B2}" type="datetime1">
               <a:rPr lang="de-CH" smtClean="0"/>
-              <a:t>19.05.2023</a:t>
+              <a:t>10.06.23</a:t>
             </a:fld>
             <a:endParaRPr lang="en-CH"/>
           </a:p>
@@ -2057,7 +2057,7 @@
           <a:p>
             <a:fld id="{6B07C490-67C7-5F43-8070-E6094F4C1724}" type="datetime1">
               <a:rPr lang="de-CH" smtClean="0"/>
-              <a:t>19.05.2023</a:t>
+              <a:t>10.06.23</a:t>
             </a:fld>
             <a:endParaRPr lang="en-CH"/>
           </a:p>
@@ -2476,7 +2476,7 @@
           <a:p>
             <a:fld id="{8503A55B-BB0E-B34B-A031-5FF92031A304}" type="datetime1">
               <a:rPr lang="de-CH" smtClean="0"/>
-              <a:t>19.05.2023</a:t>
+              <a:t>10.06.23</a:t>
             </a:fld>
             <a:endParaRPr lang="en-CH"/>
           </a:p>
@@ -2622,7 +2622,7 @@
           <a:p>
             <a:fld id="{AF514152-BB57-434E-A84C-E51BFF99A40B}" type="datetime1">
               <a:rPr lang="de-CH" smtClean="0"/>
-              <a:t>19.05.2023</a:t>
+              <a:t>10.06.23</a:t>
             </a:fld>
             <a:endParaRPr lang="en-CH"/>
           </a:p>
@@ -2739,7 +2739,7 @@
           <a:p>
             <a:fld id="{C9F11577-D47D-7C43-939D-850202A1CAE7}" type="datetime1">
               <a:rPr lang="de-CH" smtClean="0"/>
-              <a:t>19.05.2023</a:t>
+              <a:t>10.06.23</a:t>
             </a:fld>
             <a:endParaRPr lang="en-CH"/>
           </a:p>
@@ -3056,7 +3056,7 @@
           <a:p>
             <a:fld id="{D3D2D443-BC39-2749-95C8-CE765FFC693A}" type="datetime1">
               <a:rPr lang="de-CH" smtClean="0"/>
-              <a:t>19.05.2023</a:t>
+              <a:t>10.06.23</a:t>
             </a:fld>
             <a:endParaRPr lang="en-CH"/>
           </a:p>
@@ -3349,7 +3349,7 @@
           <a:p>
             <a:fld id="{BCD75DED-BE06-444C-8882-52110735FCC2}" type="datetime1">
               <a:rPr lang="de-CH" smtClean="0"/>
-              <a:t>19.05.2023</a:t>
+              <a:t>10.06.23</a:t>
             </a:fld>
             <a:endParaRPr lang="en-CH"/>
           </a:p>
@@ -3596,7 +3596,7 @@
           <a:p>
             <a:fld id="{D5771E7D-CEA1-6E49-876E-1FF630A8E942}" type="datetime1">
               <a:rPr lang="de-CH" smtClean="0"/>
-              <a:t>19.05.2023</a:t>
+              <a:t>10.06.23</a:t>
             </a:fld>
             <a:endParaRPr lang="en-CH"/>
           </a:p>
@@ -4348,7 +4348,7 @@
           <a:lstStyle/>
           <a:p>
             <a:r>
-              <a:rPr lang="en-GB" b="1">
+              <a:rPr lang="en-US" b="1">
                 <a:solidFill>
                   <a:sysClr val="windowText" lastClr="000000"/>
                 </a:solidFill>
@@ -4357,13 +4357,6 @@
               </a:rPr>
               <a:t>Adaptive AI - Group 1</a:t>
             </a:r>
-            <a:endParaRPr lang="en-CH" b="1">
-              <a:solidFill>
-                <a:sysClr val="windowText" lastClr="000000"/>
-              </a:solidFill>
-              <a:latin typeface="Arial" panose="020B0604020202020204" pitchFamily="34" charset="0"/>
-              <a:cs typeface="Arial" panose="020B0604020202020204" pitchFamily="34" charset="0"/>
-            </a:endParaRPr>
           </a:p>
         </p:txBody>
       </p:sp>
@@ -4382,7 +4375,7 @@
         <p:spPr>
           <a:xfrm>
             <a:off x="272143" y="178164"/>
-            <a:ext cx="6096000" cy="369332"/>
+            <a:ext cx="6096000" cy="307777"/>
           </a:xfrm>
           <a:prstGeom prst="rect">
             <a:avLst/>
@@ -4396,7 +4389,7 @@
           <a:lstStyle/>
           <a:p>
             <a:r>
-              <a:rPr lang="en-GB" b="1" i="0">
+              <a:rPr lang="en-US" sz="1400" b="1" i="0" dirty="0">
                 <a:effectLst/>
                 <a:latin typeface="Arial" panose="020B0604020202020204" pitchFamily="34" charset="0"/>
               </a:rPr>
@@ -4420,7 +4413,7 @@
         <p:spPr>
           <a:xfrm>
             <a:off x="272143" y="961935"/>
-            <a:ext cx="11669486" cy="369332"/>
+            <a:ext cx="11669486" cy="307777"/>
           </a:xfrm>
           <a:prstGeom prst="rect">
             <a:avLst/>
@@ -4434,7 +4427,7 @@
           <a:lstStyle/>
           <a:p>
             <a:r>
-              <a:rPr lang="en-GB" i="1">
+              <a:rPr lang="en-US" sz="1400" i="1">
                 <a:effectLst/>
                 <a:latin typeface="Arial" panose="020B0604020202020204" pitchFamily="34" charset="0"/>
               </a:rPr>
@@ -4501,7 +4494,7 @@
           <a:lstStyle/>
           <a:p>
             <a:r>
-              <a:rPr lang="en-GB" sz="1400" b="1">
+              <a:rPr lang="en-US" sz="1200" b="1">
                 <a:solidFill>
                   <a:schemeClr val="tx1"/>
                 </a:solidFill>
@@ -4510,7 +4503,7 @@
               </a:rPr>
               <a:t>Reduced costs: </a:t>
             </a:r>
-            <a:endParaRPr lang="en-GB" sz="1400" b="1">
+            <a:endParaRPr lang="en-US" sz="1200" b="1">
               <a:solidFill>
                 <a:schemeClr val="tx1"/>
               </a:solidFill>
@@ -4524,7 +4517,7 @@
               <a:buChar char="-"/>
             </a:pPr>
             <a:r>
-              <a:rPr lang="en-GB" sz="1400">
+              <a:rPr lang="en-US" sz="1200">
                 <a:solidFill>
                   <a:schemeClr val="tx1"/>
                 </a:solidFill>
@@ -4539,7 +4532,7 @@
               <a:buFont typeface="Calibri"/>
               <a:buChar char="-"/>
             </a:pPr>
-            <a:endParaRPr lang="en-GB" sz="1400">
+            <a:endParaRPr lang="en-US" sz="1200">
               <a:solidFill>
                 <a:schemeClr val="tx1"/>
               </a:solidFill>
@@ -4607,7 +4600,7 @@
           <a:lstStyle/>
           <a:p>
             <a:r>
-              <a:rPr lang="en-CH" sz="1400" b="1">
+              <a:rPr lang="en-US" sz="1200" b="1" dirty="0">
                 <a:solidFill>
                   <a:schemeClr val="tx1"/>
                 </a:solidFill>
@@ -4617,7 +4610,7 @@
               <a:t>Improved performance:</a:t>
             </a:r>
             <a:r>
-              <a:rPr lang="en-CH" sz="1400">
+              <a:rPr lang="en-US" sz="1200" dirty="0">
                 <a:solidFill>
                   <a:schemeClr val="tx1"/>
                 </a:solidFill>
@@ -4626,7 +4619,7 @@
               </a:rPr>
               <a:t> </a:t>
             </a:r>
-            <a:endParaRPr lang="de-DE">
+            <a:endParaRPr lang="en-US" sz="1200" dirty="0">
               <a:solidFill>
                 <a:schemeClr val="tx1"/>
               </a:solidFill>
@@ -4639,7 +4632,7 @@
               <a:buChar char="-"/>
             </a:pPr>
             <a:r>
-              <a:rPr lang="en-CH" sz="1400">
+              <a:rPr lang="en-US" sz="1200" dirty="0">
                 <a:solidFill>
                   <a:schemeClr val="tx1"/>
                 </a:solidFill>
@@ -4655,7 +4648,7 @@
               <a:buChar char="-"/>
             </a:pPr>
             <a:r>
-              <a:rPr lang="en-GB" sz="1400" b="0" i="0">
+              <a:rPr lang="en-US" sz="1200" b="0" i="0" dirty="0">
                 <a:solidFill>
                   <a:srgbClr val="222222"/>
                 </a:solidFill>
@@ -4664,7 +4657,7 @@
               </a:rPr>
               <a:t>Drafting paragraphs</a:t>
             </a:r>
-            <a:endParaRPr lang="en-CH" sz="1400">
+            <a:endParaRPr lang="en-US" sz="1200" dirty="0">
               <a:solidFill>
                 <a:schemeClr val="tx1"/>
               </a:solidFill>
@@ -4732,7 +4725,7 @@
           <a:lstStyle/>
           <a:p>
             <a:r>
-              <a:rPr lang="en-CH" sz="1400" b="1">
+              <a:rPr lang="en-US" sz="1200" b="1" dirty="0">
                 <a:solidFill>
                   <a:schemeClr val="tx1"/>
                 </a:solidFill>
@@ -4741,7 +4734,7 @@
               </a:rPr>
               <a:t>Better decision-making:</a:t>
             </a:r>
-            <a:endParaRPr lang="de-DE">
+            <a:endParaRPr lang="en-US" sz="1200" dirty="0">
               <a:solidFill>
                 <a:schemeClr val="tx1"/>
               </a:solidFill>
@@ -4755,7 +4748,7 @@
               <a:buChar char="-"/>
             </a:pPr>
             <a:r>
-              <a:rPr lang="en-CH" sz="1400">
+              <a:rPr lang="en-US" sz="1200" dirty="0">
                 <a:solidFill>
                   <a:schemeClr val="tx1"/>
                 </a:solidFill>
@@ -4825,7 +4818,7 @@
           <a:lstStyle/>
           <a:p>
             <a:r>
-              <a:rPr lang="en-CH" sz="1400" b="1">
+              <a:rPr lang="en-US" sz="1200" b="1">
                 <a:solidFill>
                   <a:srgbClr val="000000"/>
                 </a:solidFill>
@@ -4835,7 +4828,7 @@
               <a:t>Higher customer satisfaction:</a:t>
             </a:r>
             <a:r>
-              <a:rPr lang="en-CH" sz="1400">
+              <a:rPr lang="en-US" sz="1200">
                 <a:solidFill>
                   <a:srgbClr val="000000"/>
                 </a:solidFill>
@@ -4851,347 +4844,30 @@
               <a:buChar char="-"/>
             </a:pPr>
             <a:r>
-              <a:rPr lang="de-DE" sz="1400" err="1">
+              <a:rPr lang="en-US" sz="1200">
                 <a:solidFill>
                   <a:srgbClr val="000000"/>
                 </a:solidFill>
                 <a:latin typeface="Arial"/>
                 <a:cs typeface="Arial"/>
               </a:rPr>
-              <a:t>Easier</a:t>
-            </a:r>
-            <a:r>
-              <a:rPr lang="de-DE" sz="1400">
+              <a:t>Easier writing of paper, no having to search for words</a:t>
+            </a:r>
+          </a:p>
+          <a:p>
+            <a:pPr marL="285750" indent="-285750">
+              <a:buFont typeface="Calibri"/>
+              <a:buChar char="-"/>
+            </a:pPr>
+            <a:r>
+              <a:rPr lang="en-US" sz="1200">
                 <a:solidFill>
                   <a:srgbClr val="000000"/>
                 </a:solidFill>
                 <a:latin typeface="Arial"/>
                 <a:cs typeface="Arial"/>
               </a:rPr>
-              <a:t> </a:t>
-            </a:r>
-            <a:r>
-              <a:rPr lang="de-DE" sz="1400" err="1">
-                <a:solidFill>
-                  <a:srgbClr val="000000"/>
-                </a:solidFill>
-                <a:latin typeface="Arial"/>
-                <a:cs typeface="Arial"/>
-              </a:rPr>
-              <a:t>writing</a:t>
-            </a:r>
-            <a:r>
-              <a:rPr lang="de-DE" sz="1400">
-                <a:solidFill>
-                  <a:srgbClr val="000000"/>
-                </a:solidFill>
-                <a:latin typeface="Arial"/>
-                <a:cs typeface="Arial"/>
-              </a:rPr>
-              <a:t> </a:t>
-            </a:r>
-            <a:r>
-              <a:rPr lang="de-DE" sz="1400" err="1">
-                <a:solidFill>
-                  <a:srgbClr val="000000"/>
-                </a:solidFill>
-                <a:latin typeface="Arial"/>
-                <a:cs typeface="Arial"/>
-              </a:rPr>
-              <a:t>of</a:t>
-            </a:r>
-            <a:r>
-              <a:rPr lang="de-DE" sz="1400">
-                <a:solidFill>
-                  <a:srgbClr val="000000"/>
-                </a:solidFill>
-                <a:latin typeface="Arial"/>
-                <a:cs typeface="Arial"/>
-              </a:rPr>
-              <a:t> </a:t>
-            </a:r>
-            <a:r>
-              <a:rPr lang="de-DE" sz="1400" err="1">
-                <a:solidFill>
-                  <a:srgbClr val="000000"/>
-                </a:solidFill>
-                <a:latin typeface="Arial"/>
-                <a:cs typeface="Arial"/>
-              </a:rPr>
-              <a:t>paper</a:t>
-            </a:r>
-            <a:r>
-              <a:rPr lang="de-DE" sz="1400">
-                <a:solidFill>
-                  <a:srgbClr val="000000"/>
-                </a:solidFill>
-                <a:latin typeface="Arial"/>
-                <a:cs typeface="Arial"/>
-              </a:rPr>
-              <a:t>, </a:t>
-            </a:r>
-            <a:r>
-              <a:rPr lang="de-DE" sz="1400" err="1">
-                <a:solidFill>
-                  <a:srgbClr val="000000"/>
-                </a:solidFill>
-                <a:latin typeface="Arial"/>
-                <a:cs typeface="Arial"/>
-              </a:rPr>
-              <a:t>no</a:t>
-            </a:r>
-            <a:r>
-              <a:rPr lang="de-DE" sz="1400">
-                <a:solidFill>
-                  <a:srgbClr val="000000"/>
-                </a:solidFill>
-                <a:latin typeface="Arial"/>
-                <a:cs typeface="Arial"/>
-              </a:rPr>
-              <a:t> </a:t>
-            </a:r>
-            <a:r>
-              <a:rPr lang="de-DE" sz="1400" err="1">
-                <a:solidFill>
-                  <a:srgbClr val="000000"/>
-                </a:solidFill>
-                <a:latin typeface="Arial"/>
-                <a:cs typeface="Arial"/>
-              </a:rPr>
-              <a:t>having</a:t>
-            </a:r>
-            <a:r>
-              <a:rPr lang="de-DE" sz="1400">
-                <a:solidFill>
-                  <a:srgbClr val="000000"/>
-                </a:solidFill>
-                <a:latin typeface="Arial"/>
-                <a:cs typeface="Arial"/>
-              </a:rPr>
-              <a:t> </a:t>
-            </a:r>
-            <a:r>
-              <a:rPr lang="de-DE" sz="1400" err="1">
-                <a:solidFill>
-                  <a:srgbClr val="000000"/>
-                </a:solidFill>
-                <a:latin typeface="Arial"/>
-                <a:cs typeface="Arial"/>
-              </a:rPr>
-              <a:t>to</a:t>
-            </a:r>
-            <a:r>
-              <a:rPr lang="de-DE" sz="1400">
-                <a:solidFill>
-                  <a:srgbClr val="000000"/>
-                </a:solidFill>
-                <a:latin typeface="Arial"/>
-                <a:cs typeface="Arial"/>
-              </a:rPr>
-              <a:t> </a:t>
-            </a:r>
-            <a:r>
-              <a:rPr lang="de-DE" sz="1400" err="1">
-                <a:solidFill>
-                  <a:srgbClr val="000000"/>
-                </a:solidFill>
-                <a:latin typeface="Arial"/>
-                <a:cs typeface="Arial"/>
-              </a:rPr>
-              <a:t>search</a:t>
-            </a:r>
-            <a:r>
-              <a:rPr lang="de-DE" sz="1400">
-                <a:solidFill>
-                  <a:srgbClr val="000000"/>
-                </a:solidFill>
-                <a:latin typeface="Arial"/>
-                <a:cs typeface="Arial"/>
-              </a:rPr>
-              <a:t> </a:t>
-            </a:r>
-            <a:r>
-              <a:rPr lang="de-DE" sz="1400" err="1">
-                <a:solidFill>
-                  <a:srgbClr val="000000"/>
-                </a:solidFill>
-                <a:latin typeface="Arial"/>
-                <a:cs typeface="Arial"/>
-              </a:rPr>
-              <a:t>for</a:t>
-            </a:r>
-            <a:r>
-              <a:rPr lang="de-DE" sz="1400">
-                <a:solidFill>
-                  <a:srgbClr val="000000"/>
-                </a:solidFill>
-                <a:latin typeface="Arial"/>
-                <a:cs typeface="Arial"/>
-              </a:rPr>
-              <a:t> </a:t>
-            </a:r>
-            <a:r>
-              <a:rPr lang="de-DE" sz="1400" err="1">
-                <a:solidFill>
-                  <a:srgbClr val="000000"/>
-                </a:solidFill>
-                <a:latin typeface="Arial"/>
-                <a:cs typeface="Arial"/>
-              </a:rPr>
-              <a:t>words</a:t>
-            </a:r>
-            <a:endParaRPr lang="de-DE" sz="1400">
-              <a:solidFill>
-                <a:srgbClr val="000000"/>
-              </a:solidFill>
-              <a:latin typeface="Arial"/>
-              <a:cs typeface="Arial"/>
-            </a:endParaRPr>
-          </a:p>
-          <a:p>
-            <a:pPr marL="285750" indent="-285750">
-              <a:buFont typeface="Calibri"/>
-              <a:buChar char="-"/>
-            </a:pPr>
-            <a:r>
-              <a:rPr lang="de-DE" sz="1400">
-                <a:solidFill>
-                  <a:srgbClr val="000000"/>
-                </a:solidFill>
-                <a:latin typeface="Arial"/>
-                <a:cs typeface="Arial"/>
-              </a:rPr>
-              <a:t>Fatigue not </a:t>
-            </a:r>
-            <a:r>
-              <a:rPr lang="de-DE" sz="1400" err="1">
-                <a:solidFill>
-                  <a:srgbClr val="000000"/>
-                </a:solidFill>
-                <a:latin typeface="Arial"/>
-                <a:cs typeface="Arial"/>
-              </a:rPr>
-              <a:t>as</a:t>
-            </a:r>
-            <a:r>
-              <a:rPr lang="de-DE" sz="1400">
-                <a:solidFill>
-                  <a:srgbClr val="000000"/>
-                </a:solidFill>
-                <a:latin typeface="Arial"/>
-                <a:cs typeface="Arial"/>
-              </a:rPr>
-              <a:t> high </a:t>
-            </a:r>
-            <a:r>
-              <a:rPr lang="de-DE" sz="1400" err="1">
-                <a:solidFill>
-                  <a:srgbClr val="000000"/>
-                </a:solidFill>
-                <a:latin typeface="Arial"/>
-                <a:cs typeface="Arial"/>
-              </a:rPr>
-              <a:t>if</a:t>
-            </a:r>
-            <a:r>
-              <a:rPr lang="de-DE" sz="1400">
-                <a:solidFill>
-                  <a:srgbClr val="000000"/>
-                </a:solidFill>
-                <a:latin typeface="Arial"/>
-                <a:cs typeface="Arial"/>
-              </a:rPr>
-              <a:t> </a:t>
-            </a:r>
-            <a:r>
-              <a:rPr lang="de-DE" sz="1400" err="1">
-                <a:solidFill>
-                  <a:srgbClr val="000000"/>
-                </a:solidFill>
-                <a:latin typeface="Arial"/>
-                <a:cs typeface="Arial"/>
-              </a:rPr>
-              <a:t>people</a:t>
-            </a:r>
-            <a:r>
-              <a:rPr lang="de-DE" sz="1400">
-                <a:solidFill>
-                  <a:srgbClr val="000000"/>
-                </a:solidFill>
-                <a:latin typeface="Arial"/>
-                <a:cs typeface="Arial"/>
-              </a:rPr>
-              <a:t> </a:t>
-            </a:r>
-            <a:r>
-              <a:rPr lang="de-DE" sz="1400" err="1">
-                <a:solidFill>
-                  <a:srgbClr val="000000"/>
-                </a:solidFill>
-                <a:latin typeface="Arial"/>
-                <a:cs typeface="Arial"/>
-              </a:rPr>
-              <a:t>can</a:t>
-            </a:r>
-            <a:r>
-              <a:rPr lang="de-DE" sz="1400">
-                <a:solidFill>
-                  <a:srgbClr val="000000"/>
-                </a:solidFill>
-                <a:latin typeface="Arial"/>
-                <a:cs typeface="Arial"/>
-              </a:rPr>
-              <a:t> </a:t>
-            </a:r>
-            <a:r>
-              <a:rPr lang="de-DE" sz="1400" err="1">
-                <a:solidFill>
-                  <a:srgbClr val="000000"/>
-                </a:solidFill>
-                <a:latin typeface="Arial"/>
-                <a:cs typeface="Arial"/>
-              </a:rPr>
-              <a:t>concentrate</a:t>
-            </a:r>
-            <a:r>
-              <a:rPr lang="de-DE" sz="1400">
-                <a:solidFill>
-                  <a:srgbClr val="000000"/>
-                </a:solidFill>
-                <a:latin typeface="Arial"/>
-                <a:cs typeface="Arial"/>
-              </a:rPr>
-              <a:t> on </a:t>
-            </a:r>
-            <a:r>
-              <a:rPr lang="de-DE" sz="1400" err="1">
-                <a:solidFill>
-                  <a:srgbClr val="000000"/>
-                </a:solidFill>
-                <a:latin typeface="Arial"/>
-                <a:cs typeface="Arial"/>
-              </a:rPr>
-              <a:t>creating</a:t>
-            </a:r>
-            <a:r>
-              <a:rPr lang="de-DE" sz="1400">
-                <a:solidFill>
-                  <a:srgbClr val="000000"/>
-                </a:solidFill>
-                <a:latin typeface="Arial"/>
-                <a:cs typeface="Arial"/>
-              </a:rPr>
-              <a:t> </a:t>
-            </a:r>
-            <a:r>
-              <a:rPr lang="de-DE" sz="1400" err="1">
-                <a:solidFill>
-                  <a:srgbClr val="000000"/>
-                </a:solidFill>
-                <a:latin typeface="Arial"/>
-                <a:cs typeface="Arial"/>
-              </a:rPr>
-              <a:t>content</a:t>
+              <a:t>Fatigue not as high if people can concentrate on creating content</a:t>
             </a:r>
           </a:p>
         </p:txBody>
@@ -5254,7 +4930,7 @@
           <a:lstStyle/>
           <a:p>
             <a:r>
-              <a:rPr lang="en-CH" sz="1400" b="1">
+              <a:rPr lang="en-US" sz="1200" b="1" dirty="0">
                 <a:solidFill>
                   <a:schemeClr val="tx1"/>
                 </a:solidFill>
@@ -5264,7 +4940,7 @@
               <a:t>Better customer segmentation:</a:t>
             </a:r>
             <a:r>
-              <a:rPr lang="en-CH" sz="1400">
+              <a:rPr lang="en-US" sz="1200" dirty="0">
                 <a:solidFill>
                   <a:schemeClr val="tx1"/>
                 </a:solidFill>
@@ -5273,7 +4949,7 @@
               </a:rPr>
               <a:t> </a:t>
             </a:r>
-            <a:endParaRPr lang="de-DE">
+            <a:endParaRPr lang="en-US" sz="1200" dirty="0">
               <a:solidFill>
                 <a:schemeClr val="tx1"/>
               </a:solidFill>
@@ -5286,7 +4962,7 @@
               <a:buChar char="-"/>
             </a:pPr>
             <a:r>
-              <a:rPr lang="en-CH" sz="1400">
+              <a:rPr lang="en-US" sz="1200" dirty="0">
                 <a:solidFill>
                   <a:schemeClr val="tx1"/>
                 </a:solidFill>
@@ -5295,7 +4971,7 @@
               </a:rPr>
               <a:t>More customers as not only authors for scientific papers will be interested but also students of several age groups</a:t>
             </a:r>
-            <a:endParaRPr lang="en-CH" sz="1400">
+            <a:endParaRPr lang="en-US" sz="1200" dirty="0">
               <a:solidFill>
                 <a:schemeClr val="tx1"/>
               </a:solidFill>
@@ -5363,7 +5039,7 @@
           <a:lstStyle/>
           <a:p>
             <a:r>
-              <a:rPr lang="en-CH" sz="1400" b="1">
+              <a:rPr lang="en-US" sz="1200" b="1" dirty="0">
                 <a:solidFill>
                   <a:schemeClr val="tx1"/>
                 </a:solidFill>
@@ -5373,7 +5049,7 @@
               <a:t>Improved customer experience:</a:t>
             </a:r>
             <a:r>
-              <a:rPr lang="en-CH" sz="1400">
+              <a:rPr lang="en-US" sz="1200" dirty="0">
                 <a:solidFill>
                   <a:schemeClr val="tx1"/>
                 </a:solidFill>
@@ -5382,7 +5058,7 @@
               </a:rPr>
               <a:t> </a:t>
             </a:r>
-            <a:endParaRPr lang="en-CH" sz="1400">
+            <a:endParaRPr lang="en-US" sz="1200" dirty="0">
               <a:solidFill>
                 <a:schemeClr val="tx1"/>
               </a:solidFill>
@@ -5396,7 +5072,7 @@
               <a:buChar char="-"/>
             </a:pPr>
             <a:r>
-              <a:rPr lang="en-CH" sz="1400">
+              <a:rPr lang="en-US" sz="1200" dirty="0">
                 <a:solidFill>
                   <a:schemeClr val="tx1"/>
                 </a:solidFill>
@@ -5412,7 +5088,7 @@
               <a:buChar char="-"/>
             </a:pPr>
             <a:r>
-              <a:rPr lang="en-CH" sz="1400">
+              <a:rPr lang="en-US" sz="1200" dirty="0">
                 <a:solidFill>
                   <a:schemeClr val="tx1"/>
                 </a:solidFill>
@@ -5428,7 +5104,7 @@
               <a:buChar char="-"/>
             </a:pPr>
             <a:r>
-              <a:rPr lang="en-CH" sz="1400">
+              <a:rPr lang="en-US" sz="1200" dirty="0">
                 <a:solidFill>
                   <a:schemeClr val="tx1"/>
                 </a:solidFill>
@@ -5437,7 +5113,7 @@
               </a:rPr>
               <a:t>Faster time to publication</a:t>
             </a:r>
-            <a:endParaRPr lang="en-CH" sz="1400">
+            <a:endParaRPr lang="en-US" sz="1200" dirty="0">
               <a:solidFill>
                 <a:schemeClr val="tx1"/>
               </a:solidFill>
@@ -5505,7 +5181,7 @@
           <a:lstStyle/>
           <a:p>
             <a:r>
-              <a:rPr lang="en-CH" sz="1400" b="1">
+              <a:rPr lang="en-US" sz="1200" b="1" dirty="0">
                 <a:solidFill>
                   <a:sysClr val="windowText" lastClr="000000"/>
                 </a:solidFill>
@@ -5515,7 +5191,7 @@
               <a:t>Better products &amp; services:</a:t>
             </a:r>
             <a:r>
-              <a:rPr lang="en-CH" sz="1400">
+              <a:rPr lang="en-US" sz="1200" dirty="0">
                 <a:solidFill>
                   <a:sysClr val="windowText" lastClr="000000"/>
                 </a:solidFill>
@@ -5531,24 +5207,30 @@
               <a:buChar char="-"/>
             </a:pPr>
             <a:r>
-              <a:rPr lang="en-GB" sz="1400">
+              <a:rPr lang="en-US" sz="1200" dirty="0">
                 <a:solidFill>
                   <a:sysClr val="windowText" lastClr="000000"/>
                 </a:solidFill>
                 <a:latin typeface="Arial" panose="020B0604020202020204" pitchFamily="34" charset="0"/>
                 <a:cs typeface="Arial" panose="020B0604020202020204" pitchFamily="34" charset="0"/>
               </a:rPr>
-              <a:t>C</a:t>
-            </a:r>
-            <a:r>
-              <a:rPr lang="en-CH" sz="1400">
+              <a:t>Can write more papers = more for the publisher to publish</a:t>
+            </a:r>
+          </a:p>
+          <a:p>
+            <a:pPr marL="285750" indent="-285750">
+              <a:buFontTx/>
+              <a:buChar char="-"/>
+            </a:pPr>
+            <a:r>
+              <a:rPr lang="en-US" sz="1200" dirty="0">
                 <a:solidFill>
                   <a:sysClr val="windowText" lastClr="000000"/>
                 </a:solidFill>
                 <a:latin typeface="Arial" panose="020B0604020202020204" pitchFamily="34" charset="0"/>
                 <a:cs typeface="Arial" panose="020B0604020202020204" pitchFamily="34" charset="0"/>
               </a:rPr>
-              <a:t>an write more papers = more for the publisher to publish</a:t>
+              <a:t>Language and grammar check</a:t>
             </a:r>
           </a:p>
           <a:p>
@@ -5556,33 +5238,7 @@
               <a:buFontTx/>
               <a:buChar char="-"/>
             </a:pPr>
-            <a:r>
-              <a:rPr lang="en-GB" sz="1400">
-                <a:solidFill>
-                  <a:sysClr val="windowText" lastClr="000000"/>
-                </a:solidFill>
-                <a:latin typeface="Arial" panose="020B0604020202020204" pitchFamily="34" charset="0"/>
-                <a:cs typeface="Arial" panose="020B0604020202020204" pitchFamily="34" charset="0"/>
-              </a:rPr>
-              <a:t>L</a:t>
-            </a:r>
-            <a:r>
-              <a:rPr lang="en-CH" sz="1400">
-                <a:solidFill>
-                  <a:sysClr val="windowText" lastClr="000000"/>
-                </a:solidFill>
-                <a:latin typeface="Arial" panose="020B0604020202020204" pitchFamily="34" charset="0"/>
-                <a:cs typeface="Arial" panose="020B0604020202020204" pitchFamily="34" charset="0"/>
-              </a:rPr>
-              <a:t>anguage and grammar check</a:t>
-            </a:r>
-          </a:p>
-          <a:p>
-            <a:pPr marL="285750" indent="-285750">
-              <a:buFontTx/>
-              <a:buChar char="-"/>
-            </a:pPr>
-            <a:endParaRPr lang="en-CH" sz="1400">
+            <a:endParaRPr lang="en-US" sz="1200" dirty="0">
               <a:solidFill>
                 <a:sysClr val="windowText" lastClr="000000"/>
               </a:solidFill>
@@ -5650,36 +5306,16 @@
           <a:lstStyle/>
           <a:p>
             <a:r>
-              <a:rPr lang="en-CH" sz="1400" b="1">
+              <a:rPr lang="en-US" sz="1200" b="1">
                 <a:solidFill>
                   <a:schemeClr val="tx1"/>
                 </a:solidFill>
                 <a:latin typeface="Arial"/>
                 <a:cs typeface="Arial"/>
               </a:rPr>
-              <a:t>Business </a:t>
-            </a:r>
-            <a:r>
-              <a:rPr lang="en-CH" sz="1400" b="1" err="1">
-                <a:solidFill>
-                  <a:schemeClr val="tx1"/>
-                </a:solidFill>
-                <a:latin typeface="Arial"/>
-                <a:cs typeface="Arial"/>
-              </a:rPr>
-              <a:t>innovation</a:t>
-            </a:r>
-            <a:r>
-              <a:rPr lang="en-CH" sz="1400" b="1">
-                <a:solidFill>
-                  <a:schemeClr val="tx1"/>
-                </a:solidFill>
-                <a:latin typeface="Arial"/>
-                <a:cs typeface="Arial"/>
-              </a:rPr>
-              <a:t>:</a:t>
-            </a:r>
-            <a:endParaRPr lang="de-DE" sz="1400">
+              <a:t>Business innovation:</a:t>
+            </a:r>
+            <a:endParaRPr lang="en-US" sz="1200">
               <a:solidFill>
                 <a:schemeClr val="tx1"/>
               </a:solidFill>
@@ -5693,7 +5329,7 @@
               <a:buChar char="-"/>
             </a:pPr>
             <a:r>
-              <a:rPr lang="en-US" sz="1400">
+              <a:rPr lang="en-US" sz="1200">
                 <a:solidFill>
                   <a:schemeClr val="tx1"/>
                 </a:solidFill>
@@ -5709,7 +5345,7 @@
               <a:buChar char="-"/>
             </a:pPr>
             <a:r>
-              <a:rPr lang="en-US" sz="1400">
+              <a:rPr lang="en-US" sz="1200">
                 <a:solidFill>
                   <a:schemeClr val="tx1"/>
                 </a:solidFill>
@@ -5719,7 +5355,7 @@
               </a:rPr>
               <a:t>Contextual Knowledge Integration (Integration of Scientific research based on AI tool)</a:t>
             </a:r>
-            <a:endParaRPr lang="en-US" sz="1400">
+            <a:endParaRPr lang="en-US" sz="1200">
               <a:solidFill>
                 <a:schemeClr val="tx1"/>
               </a:solidFill>
@@ -6344,6 +5980,15 @@
 </file>
 
 <file path=customXml/item2.xml><?xml version="1.0" encoding="utf-8"?>
+<?mso-contentType ?>
+<FormTemplates xmlns="http://schemas.microsoft.com/sharepoint/v3/contenttype/forms">
+  <Display>DocumentLibraryForm</Display>
+  <Edit>DocumentLibraryForm</Edit>
+  <New>DocumentLibraryForm</New>
+</FormTemplates>
+</file>
+
+<file path=customXml/item3.xml><?xml version="1.0" encoding="utf-8"?>
 <ct:contentTypeSchema xmlns:ct="http://schemas.microsoft.com/office/2006/metadata/contentType" xmlns:ma="http://schemas.microsoft.com/office/2006/metadata/properties/metaAttributes" ct:_="" ma:_="" ma:contentTypeName="Dokument" ma:contentTypeID="0x0101000C5310FA4BA7EE4EB85203465CD06E84" ma:contentTypeVersion="12" ma:contentTypeDescription="Ein neues Dokument erstellen." ma:contentTypeScope="" ma:versionID="dc35a08a157c87f46bc17e0c6622183c">
   <xsd:schema xmlns:xsd="http://www.w3.org/2001/XMLSchema" xmlns:xs="http://www.w3.org/2001/XMLSchema" xmlns:p="http://schemas.microsoft.com/office/2006/metadata/properties" xmlns:ns2="5bb6cf1e-781f-4cfe-9692-d5d3f021aa4c" xmlns:ns3="a85fa41f-78bd-4d46-ae3a-58d806f5ce00" targetNamespace="http://schemas.microsoft.com/office/2006/metadata/properties" ma:root="true" ma:fieldsID="d54619416cdff48674869510bc3b0fd0" ns2:_="" ns3:_="">
     <xsd:import namespace="5bb6cf1e-781f-4cfe-9692-d5d3f021aa4c"/>
@@ -6560,15 +6205,6 @@
 </ct:contentTypeSchema>
 </file>
 
-<file path=customXml/item3.xml><?xml version="1.0" encoding="utf-8"?>
-<?mso-contentType ?>
-<FormTemplates xmlns="http://schemas.microsoft.com/sharepoint/v3/contenttype/forms">
-  <Display>DocumentLibraryForm</Display>
-  <Edit>DocumentLibraryForm</Edit>
-  <New>DocumentLibraryForm</New>
-</FormTemplates>
-</file>
-
 <file path=customXml/itemProps1.xml><?xml version="1.0" encoding="utf-8"?>
 <ds:datastoreItem xmlns:ds="http://schemas.openxmlformats.org/officeDocument/2006/customXml" ds:itemID="{E7181FE1-7979-4BE6-AECA-DB9DBC40159B}">
   <ds:schemaRefs>
@@ -6587,6 +6223,14 @@
 </file>
 
 <file path=customXml/itemProps2.xml><?xml version="1.0" encoding="utf-8"?>
+<ds:datastoreItem xmlns:ds="http://schemas.openxmlformats.org/officeDocument/2006/customXml" ds:itemID="{FAD8A573-AC23-4CBF-9682-568F6C9F90C5}">
+  <ds:schemaRefs>
+    <ds:schemaRef ds:uri="http://schemas.microsoft.com/sharepoint/v3/contenttype/forms"/>
+  </ds:schemaRefs>
+</ds:datastoreItem>
+</file>
+
+<file path=customXml/itemProps3.xml><?xml version="1.0" encoding="utf-8"?>
 <ds:datastoreItem xmlns:ds="http://schemas.openxmlformats.org/officeDocument/2006/customXml" ds:itemID="{745316CC-6D69-4D72-A1DE-49E8948B5269}">
   <ds:schemaRefs>
     <ds:schemaRef ds:uri="5bb6cf1e-781f-4cfe-9692-d5d3f021aa4c"/>
@@ -6603,12 +6247,4 @@
     <ds:schemaRef ds:uri="http://www.w3.org/2001/XMLSchema"/>
   </ds:schemaRefs>
 </ds:datastoreItem>
-</file>
-
-<file path=customXml/itemProps3.xml><?xml version="1.0" encoding="utf-8"?>
-<ds:datastoreItem xmlns:ds="http://schemas.openxmlformats.org/officeDocument/2006/customXml" ds:itemID="{FAD8A573-AC23-4CBF-9682-568F6C9F90C5}">
-  <ds:schemaRefs>
-    <ds:schemaRef ds:uri="http://schemas.microsoft.com/sharepoint/v3/contenttype/forms"/>
-  </ds:schemaRefs>
-</ds:datastoreItem>
 </file>
</xml_diff>